<commit_message>
add pdf, fix some mistakes
</commit_message>
<xml_diff>
--- a/Presentation Wilde coursera capstone.pptx
+++ b/Presentation Wilde coursera capstone.pptx
@@ -113,6 +113,11 @@
       </a:defRPr>
     </a:lvl9pPr>
   </p:defaultTextStyle>
+  <p:extLst>
+    <p:ext uri="{EFAFB233-063F-42B5-8137-9DF3F51BA10A}">
+      <p15:sldGuideLst xmlns:p15="http://schemas.microsoft.com/office/powerpoint/2012/main"/>
+    </p:ext>
+  </p:extLst>
 </p:presentation>
 </file>
 
@@ -5850,7 +5855,18 @@
           <a:p>
             <a:r>
               <a:rPr lang="en-US" dirty="0" smtClean="0"/>
-              <a:t>Coursera Capstone</a:t>
+              <a:t>Coursera </a:t>
+            </a:r>
+            <a:r>
+              <a:rPr lang="en-US" dirty="0" smtClean="0"/>
+              <a:t>Capstone</a:t>
+            </a:r>
+            <a:br>
+              <a:rPr lang="en-US" dirty="0" smtClean="0"/>
+            </a:br>
+            <a:r>
+              <a:rPr lang="en-US" dirty="0" smtClean="0"/>
+              <a:t>Car accidents</a:t>
             </a:r>
             <a:endParaRPr lang="ru-RU" dirty="0"/>
           </a:p>
@@ -6595,8 +6611,8 @@
         </p:blipFill>
         <p:spPr>
           <a:xfrm>
-            <a:off x="1937544" y="3134519"/>
-            <a:ext cx="6076950" cy="1933575"/>
+            <a:off x="677334" y="2071837"/>
+            <a:ext cx="8809124" cy="2802903"/>
           </a:xfrm>
           <a:prstGeom prst="rect">
             <a:avLst/>

</xml_diff>